<commit_message>
Fix font bugs for docx
</commit_message>
<xml_diff>
--- a/res/a.pptx
+++ b/res/a.pptx
@@ -10,6 +10,7 @@
     <p:sldId id="258" r:id="rId4"/>
     <p:sldId id="259" r:id="rId5"/>
     <p:sldId id="260" r:id="rId6"/>
+    <p:sldId id="261" r:id="rId7"/>
   </p:sldIdLst>
   <p:sldSz cx="12192000" cy="6858000"/>
   <p:notesSz cx="6858000" cy="9144000"/>
@@ -110,7 +111,7 @@
   </p:defaultTextStyle>
   <p:extLst>
     <p:ext uri="{EFAFB233-063F-42B5-8137-9DF3F51BA10A}">
-      <p15:sldGuideLst xmlns:p15="http://schemas.microsoft.com/office/powerpoint/2012/main"/>
+      <p15:sldGuideLst xmlns:p15="http://schemas.microsoft.com/office/powerpoint/2012/main" xmlns=""/>
     </p:ext>
   </p:extLst>
 </p:presentation>
@@ -247,7 +248,8 @@
           <a:p>
             <a:fld id="{77324A50-F531-4161-B274-F57934302FD1}" type="datetimeFigureOut">
               <a:rPr lang="zh-CN" altLang="en-US" smtClean="0"/>
-              <a:t>2017/6/1</a:t>
+              <a:pPr/>
+              <a:t>2017/6/5 Monday</a:t>
             </a:fld>
             <a:endParaRPr lang="zh-CN" altLang="en-US"/>
           </a:p>
@@ -289,6 +291,7 @@
           <a:p>
             <a:fld id="{4FC7B188-DE97-4792-9D96-02BA9E869605}" type="slidenum">
               <a:rPr lang="zh-CN" altLang="en-US" smtClean="0"/>
+              <a:pPr/>
               <a:t>‹#›</a:t>
             </a:fld>
             <a:endParaRPr lang="zh-CN" altLang="en-US"/>
@@ -298,7 +301,7 @@
     </p:spTree>
     <p:extLst>
       <p:ext uri="{BB962C8B-B14F-4D97-AF65-F5344CB8AC3E}">
-        <p14:creationId xmlns:p14="http://schemas.microsoft.com/office/powerpoint/2010/main" val="3510445028"/>
+        <p14:creationId xmlns:p14="http://schemas.microsoft.com/office/powerpoint/2010/main" xmlns="" val="3510445028"/>
       </p:ext>
     </p:extLst>
   </p:cSld>
@@ -417,7 +420,8 @@
           <a:p>
             <a:fld id="{77324A50-F531-4161-B274-F57934302FD1}" type="datetimeFigureOut">
               <a:rPr lang="zh-CN" altLang="en-US" smtClean="0"/>
-              <a:t>2017/6/1</a:t>
+              <a:pPr/>
+              <a:t>2017/6/5 Monday</a:t>
             </a:fld>
             <a:endParaRPr lang="zh-CN" altLang="en-US"/>
           </a:p>
@@ -459,6 +463,7 @@
           <a:p>
             <a:fld id="{4FC7B188-DE97-4792-9D96-02BA9E869605}" type="slidenum">
               <a:rPr lang="zh-CN" altLang="en-US" smtClean="0"/>
+              <a:pPr/>
               <a:t>‹#›</a:t>
             </a:fld>
             <a:endParaRPr lang="zh-CN" altLang="en-US"/>
@@ -468,7 +473,7 @@
     </p:spTree>
     <p:extLst>
       <p:ext uri="{BB962C8B-B14F-4D97-AF65-F5344CB8AC3E}">
-        <p14:creationId xmlns:p14="http://schemas.microsoft.com/office/powerpoint/2010/main" val="459343900"/>
+        <p14:creationId xmlns:p14="http://schemas.microsoft.com/office/powerpoint/2010/main" xmlns="" val="459343900"/>
       </p:ext>
     </p:extLst>
   </p:cSld>
@@ -597,7 +602,8 @@
           <a:p>
             <a:fld id="{77324A50-F531-4161-B274-F57934302FD1}" type="datetimeFigureOut">
               <a:rPr lang="zh-CN" altLang="en-US" smtClean="0"/>
-              <a:t>2017/6/1</a:t>
+              <a:pPr/>
+              <a:t>2017/6/5 Monday</a:t>
             </a:fld>
             <a:endParaRPr lang="zh-CN" altLang="en-US"/>
           </a:p>
@@ -639,6 +645,7 @@
           <a:p>
             <a:fld id="{4FC7B188-DE97-4792-9D96-02BA9E869605}" type="slidenum">
               <a:rPr lang="zh-CN" altLang="en-US" smtClean="0"/>
+              <a:pPr/>
               <a:t>‹#›</a:t>
             </a:fld>
             <a:endParaRPr lang="zh-CN" altLang="en-US"/>
@@ -648,7 +655,7 @@
     </p:spTree>
     <p:extLst>
       <p:ext uri="{BB962C8B-B14F-4D97-AF65-F5344CB8AC3E}">
-        <p14:creationId xmlns:p14="http://schemas.microsoft.com/office/powerpoint/2010/main" val="3886962042"/>
+        <p14:creationId xmlns:p14="http://schemas.microsoft.com/office/powerpoint/2010/main" xmlns="" val="3886962042"/>
       </p:ext>
     </p:extLst>
   </p:cSld>
@@ -767,7 +774,8 @@
           <a:p>
             <a:fld id="{77324A50-F531-4161-B274-F57934302FD1}" type="datetimeFigureOut">
               <a:rPr lang="zh-CN" altLang="en-US" smtClean="0"/>
-              <a:t>2017/6/1</a:t>
+              <a:pPr/>
+              <a:t>2017/6/5 Monday</a:t>
             </a:fld>
             <a:endParaRPr lang="zh-CN" altLang="en-US"/>
           </a:p>
@@ -809,6 +817,7 @@
           <a:p>
             <a:fld id="{4FC7B188-DE97-4792-9D96-02BA9E869605}" type="slidenum">
               <a:rPr lang="zh-CN" altLang="en-US" smtClean="0"/>
+              <a:pPr/>
               <a:t>‹#›</a:t>
             </a:fld>
             <a:endParaRPr lang="zh-CN" altLang="en-US"/>
@@ -818,7 +827,7 @@
     </p:spTree>
     <p:extLst>
       <p:ext uri="{BB962C8B-B14F-4D97-AF65-F5344CB8AC3E}">
-        <p14:creationId xmlns:p14="http://schemas.microsoft.com/office/powerpoint/2010/main" val="1314054142"/>
+        <p14:creationId xmlns:p14="http://schemas.microsoft.com/office/powerpoint/2010/main" xmlns="" val="1314054142"/>
       </p:ext>
     </p:extLst>
   </p:cSld>
@@ -1013,7 +1022,8 @@
           <a:p>
             <a:fld id="{77324A50-F531-4161-B274-F57934302FD1}" type="datetimeFigureOut">
               <a:rPr lang="zh-CN" altLang="en-US" smtClean="0"/>
-              <a:t>2017/6/1</a:t>
+              <a:pPr/>
+              <a:t>2017/6/5 Monday</a:t>
             </a:fld>
             <a:endParaRPr lang="zh-CN" altLang="en-US"/>
           </a:p>
@@ -1055,6 +1065,7 @@
           <a:p>
             <a:fld id="{4FC7B188-DE97-4792-9D96-02BA9E869605}" type="slidenum">
               <a:rPr lang="zh-CN" altLang="en-US" smtClean="0"/>
+              <a:pPr/>
               <a:t>‹#›</a:t>
             </a:fld>
             <a:endParaRPr lang="zh-CN" altLang="en-US"/>
@@ -1064,7 +1075,7 @@
     </p:spTree>
     <p:extLst>
       <p:ext uri="{BB962C8B-B14F-4D97-AF65-F5344CB8AC3E}">
-        <p14:creationId xmlns:p14="http://schemas.microsoft.com/office/powerpoint/2010/main" val="15804600"/>
+        <p14:creationId xmlns:p14="http://schemas.microsoft.com/office/powerpoint/2010/main" xmlns="" val="15804600"/>
       </p:ext>
     </p:extLst>
   </p:cSld>
@@ -1245,7 +1256,8 @@
           <a:p>
             <a:fld id="{77324A50-F531-4161-B274-F57934302FD1}" type="datetimeFigureOut">
               <a:rPr lang="zh-CN" altLang="en-US" smtClean="0"/>
-              <a:t>2017/6/1</a:t>
+              <a:pPr/>
+              <a:t>2017/6/5 Monday</a:t>
             </a:fld>
             <a:endParaRPr lang="zh-CN" altLang="en-US"/>
           </a:p>
@@ -1287,6 +1299,7 @@
           <a:p>
             <a:fld id="{4FC7B188-DE97-4792-9D96-02BA9E869605}" type="slidenum">
               <a:rPr lang="zh-CN" altLang="en-US" smtClean="0"/>
+              <a:pPr/>
               <a:t>‹#›</a:t>
             </a:fld>
             <a:endParaRPr lang="zh-CN" altLang="en-US"/>
@@ -1296,7 +1309,7 @@
     </p:spTree>
     <p:extLst>
       <p:ext uri="{BB962C8B-B14F-4D97-AF65-F5344CB8AC3E}">
-        <p14:creationId xmlns:p14="http://schemas.microsoft.com/office/powerpoint/2010/main" val="2390060365"/>
+        <p14:creationId xmlns:p14="http://schemas.microsoft.com/office/powerpoint/2010/main" xmlns="" val="2390060365"/>
       </p:ext>
     </p:extLst>
   </p:cSld>
@@ -1612,7 +1625,8 @@
           <a:p>
             <a:fld id="{77324A50-F531-4161-B274-F57934302FD1}" type="datetimeFigureOut">
               <a:rPr lang="zh-CN" altLang="en-US" smtClean="0"/>
-              <a:t>2017/6/1</a:t>
+              <a:pPr/>
+              <a:t>2017/6/5 Monday</a:t>
             </a:fld>
             <a:endParaRPr lang="zh-CN" altLang="en-US"/>
           </a:p>
@@ -1654,6 +1668,7 @@
           <a:p>
             <a:fld id="{4FC7B188-DE97-4792-9D96-02BA9E869605}" type="slidenum">
               <a:rPr lang="zh-CN" altLang="en-US" smtClean="0"/>
+              <a:pPr/>
               <a:t>‹#›</a:t>
             </a:fld>
             <a:endParaRPr lang="zh-CN" altLang="en-US"/>
@@ -1663,7 +1678,7 @@
     </p:spTree>
     <p:extLst>
       <p:ext uri="{BB962C8B-B14F-4D97-AF65-F5344CB8AC3E}">
-        <p14:creationId xmlns:p14="http://schemas.microsoft.com/office/powerpoint/2010/main" val="4034478915"/>
+        <p14:creationId xmlns:p14="http://schemas.microsoft.com/office/powerpoint/2010/main" xmlns="" val="4034478915"/>
       </p:ext>
     </p:extLst>
   </p:cSld>
@@ -1730,7 +1745,8 @@
           <a:p>
             <a:fld id="{77324A50-F531-4161-B274-F57934302FD1}" type="datetimeFigureOut">
               <a:rPr lang="zh-CN" altLang="en-US" smtClean="0"/>
-              <a:t>2017/6/1</a:t>
+              <a:pPr/>
+              <a:t>2017/6/5 Monday</a:t>
             </a:fld>
             <a:endParaRPr lang="zh-CN" altLang="en-US"/>
           </a:p>
@@ -1772,6 +1788,7 @@
           <a:p>
             <a:fld id="{4FC7B188-DE97-4792-9D96-02BA9E869605}" type="slidenum">
               <a:rPr lang="zh-CN" altLang="en-US" smtClean="0"/>
+              <a:pPr/>
               <a:t>‹#›</a:t>
             </a:fld>
             <a:endParaRPr lang="zh-CN" altLang="en-US"/>
@@ -1781,7 +1798,7 @@
     </p:spTree>
     <p:extLst>
       <p:ext uri="{BB962C8B-B14F-4D97-AF65-F5344CB8AC3E}">
-        <p14:creationId xmlns:p14="http://schemas.microsoft.com/office/powerpoint/2010/main" val="265422175"/>
+        <p14:creationId xmlns:p14="http://schemas.microsoft.com/office/powerpoint/2010/main" xmlns="" val="265422175"/>
       </p:ext>
     </p:extLst>
   </p:cSld>
@@ -1825,7 +1842,8 @@
           <a:p>
             <a:fld id="{77324A50-F531-4161-B274-F57934302FD1}" type="datetimeFigureOut">
               <a:rPr lang="zh-CN" altLang="en-US" smtClean="0"/>
-              <a:t>2017/6/1</a:t>
+              <a:pPr/>
+              <a:t>2017/6/5 Monday</a:t>
             </a:fld>
             <a:endParaRPr lang="zh-CN" altLang="en-US"/>
           </a:p>
@@ -1867,6 +1885,7 @@
           <a:p>
             <a:fld id="{4FC7B188-DE97-4792-9D96-02BA9E869605}" type="slidenum">
               <a:rPr lang="zh-CN" altLang="en-US" smtClean="0"/>
+              <a:pPr/>
               <a:t>‹#›</a:t>
             </a:fld>
             <a:endParaRPr lang="zh-CN" altLang="en-US"/>
@@ -1876,7 +1895,7 @@
     </p:spTree>
     <p:extLst>
       <p:ext uri="{BB962C8B-B14F-4D97-AF65-F5344CB8AC3E}">
-        <p14:creationId xmlns:p14="http://schemas.microsoft.com/office/powerpoint/2010/main" val="3386491421"/>
+        <p14:creationId xmlns:p14="http://schemas.microsoft.com/office/powerpoint/2010/main" xmlns="" val="3386491421"/>
       </p:ext>
     </p:extLst>
   </p:cSld>
@@ -2102,7 +2121,8 @@
           <a:p>
             <a:fld id="{77324A50-F531-4161-B274-F57934302FD1}" type="datetimeFigureOut">
               <a:rPr lang="zh-CN" altLang="en-US" smtClean="0"/>
-              <a:t>2017/6/1</a:t>
+              <a:pPr/>
+              <a:t>2017/6/5 Monday</a:t>
             </a:fld>
             <a:endParaRPr lang="zh-CN" altLang="en-US"/>
           </a:p>
@@ -2144,6 +2164,7 @@
           <a:p>
             <a:fld id="{4FC7B188-DE97-4792-9D96-02BA9E869605}" type="slidenum">
               <a:rPr lang="zh-CN" altLang="en-US" smtClean="0"/>
+              <a:pPr/>
               <a:t>‹#›</a:t>
             </a:fld>
             <a:endParaRPr lang="zh-CN" altLang="en-US"/>
@@ -2153,7 +2174,7 @@
     </p:spTree>
     <p:extLst>
       <p:ext uri="{BB962C8B-B14F-4D97-AF65-F5344CB8AC3E}">
-        <p14:creationId xmlns:p14="http://schemas.microsoft.com/office/powerpoint/2010/main" val="3244236091"/>
+        <p14:creationId xmlns:p14="http://schemas.microsoft.com/office/powerpoint/2010/main" xmlns="" val="3244236091"/>
       </p:ext>
     </p:extLst>
   </p:cSld>
@@ -2355,7 +2376,8 @@
           <a:p>
             <a:fld id="{77324A50-F531-4161-B274-F57934302FD1}" type="datetimeFigureOut">
               <a:rPr lang="zh-CN" altLang="en-US" smtClean="0"/>
-              <a:t>2017/6/1</a:t>
+              <a:pPr/>
+              <a:t>2017/6/5 Monday</a:t>
             </a:fld>
             <a:endParaRPr lang="zh-CN" altLang="en-US"/>
           </a:p>
@@ -2397,6 +2419,7 @@
           <a:p>
             <a:fld id="{4FC7B188-DE97-4792-9D96-02BA9E869605}" type="slidenum">
               <a:rPr lang="zh-CN" altLang="en-US" smtClean="0"/>
+              <a:pPr/>
               <a:t>‹#›</a:t>
             </a:fld>
             <a:endParaRPr lang="zh-CN" altLang="en-US"/>
@@ -2406,7 +2429,7 @@
     </p:spTree>
     <p:extLst>
       <p:ext uri="{BB962C8B-B14F-4D97-AF65-F5344CB8AC3E}">
-        <p14:creationId xmlns:p14="http://schemas.microsoft.com/office/powerpoint/2010/main" val="2692647348"/>
+        <p14:creationId xmlns:p14="http://schemas.microsoft.com/office/powerpoint/2010/main" xmlns="" val="2692647348"/>
       </p:ext>
     </p:extLst>
   </p:cSld>
@@ -2568,7 +2591,8 @@
           <a:p>
             <a:fld id="{77324A50-F531-4161-B274-F57934302FD1}" type="datetimeFigureOut">
               <a:rPr lang="zh-CN" altLang="en-US" smtClean="0"/>
-              <a:t>2017/6/1</a:t>
+              <a:pPr/>
+              <a:t>2017/6/5 Monday</a:t>
             </a:fld>
             <a:endParaRPr lang="zh-CN" altLang="en-US"/>
           </a:p>
@@ -2646,6 +2670,7 @@
           <a:p>
             <a:fld id="{4FC7B188-DE97-4792-9D96-02BA9E869605}" type="slidenum">
               <a:rPr lang="zh-CN" altLang="en-US" smtClean="0"/>
+              <a:pPr/>
               <a:t>‹#›</a:t>
             </a:fld>
             <a:endParaRPr lang="zh-CN" altLang="en-US"/>
@@ -2655,7 +2680,7 @@
     </p:spTree>
     <p:extLst>
       <p:ext uri="{BB962C8B-B14F-4D97-AF65-F5344CB8AC3E}">
-        <p14:creationId xmlns:p14="http://schemas.microsoft.com/office/powerpoint/2010/main" val="1604192788"/>
+        <p14:creationId xmlns:p14="http://schemas.microsoft.com/office/powerpoint/2010/main" xmlns="" val="1604192788"/>
       </p:ext>
     </p:extLst>
   </p:cSld>
@@ -3043,7 +3068,7 @@
     </p:spTree>
     <p:extLst>
       <p:ext uri="{BB962C8B-B14F-4D97-AF65-F5344CB8AC3E}">
-        <p14:creationId xmlns:p14="http://schemas.microsoft.com/office/powerpoint/2010/main" val="1850028250"/>
+        <p14:creationId xmlns:p14="http://schemas.microsoft.com/office/powerpoint/2010/main" xmlns="" val="1850028250"/>
       </p:ext>
     </p:extLst>
   </p:cSld>
@@ -3127,7 +3152,7 @@
     </p:spTree>
     <p:extLst>
       <p:ext uri="{BB962C8B-B14F-4D97-AF65-F5344CB8AC3E}">
-        <p14:creationId xmlns:p14="http://schemas.microsoft.com/office/powerpoint/2010/main" val="4134404396"/>
+        <p14:creationId xmlns:p14="http://schemas.microsoft.com/office/powerpoint/2010/main" xmlns="" val="4134404396"/>
       </p:ext>
     </p:extLst>
   </p:cSld>
@@ -3211,7 +3236,7 @@
     </p:spTree>
     <p:extLst>
       <p:ext uri="{BB962C8B-B14F-4D97-AF65-F5344CB8AC3E}">
-        <p14:creationId xmlns:p14="http://schemas.microsoft.com/office/powerpoint/2010/main" val="625124122"/>
+        <p14:creationId xmlns:p14="http://schemas.microsoft.com/office/powerpoint/2010/main" xmlns="" val="625124122"/>
       </p:ext>
     </p:extLst>
   </p:cSld>
@@ -3295,7 +3320,7 @@
     </p:spTree>
     <p:extLst>
       <p:ext uri="{BB962C8B-B14F-4D97-AF65-F5344CB8AC3E}">
-        <p14:creationId xmlns:p14="http://schemas.microsoft.com/office/powerpoint/2010/main" val="2096724783"/>
+        <p14:creationId xmlns:p14="http://schemas.microsoft.com/office/powerpoint/2010/main" xmlns="" val="2096724783"/>
       </p:ext>
     </p:extLst>
   </p:cSld>
@@ -3379,9 +3404,102 @@
     </p:spTree>
     <p:extLst>
       <p:ext uri="{BB962C8B-B14F-4D97-AF65-F5344CB8AC3E}">
-        <p14:creationId xmlns:p14="http://schemas.microsoft.com/office/powerpoint/2010/main" val="2838731387"/>
+        <p14:creationId xmlns:p14="http://schemas.microsoft.com/office/powerpoint/2010/main" xmlns="" val="2838731387"/>
       </p:ext>
     </p:extLst>
+  </p:cSld>
+  <p:clrMapOvr>
+    <a:masterClrMapping/>
+  </p:clrMapOvr>
+</p:sld>
+</file>
+
+<file path=ppt/slides/slide6.xml><?xml version="1.0" encoding="utf-8"?>
+<p:sld xmlns:a="http://schemas.openxmlformats.org/drawingml/2006/main" xmlns:r="http://schemas.openxmlformats.org/officeDocument/2006/relationships" xmlns:p="http://schemas.openxmlformats.org/presentationml/2006/main">
+  <p:cSld>
+    <p:spTree>
+      <p:nvGrpSpPr>
+        <p:cNvPr id="1" name=""/>
+        <p:cNvGrpSpPr/>
+        <p:nvPr/>
+      </p:nvGrpSpPr>
+      <p:grpSpPr>
+        <a:xfrm>
+          <a:off x="0" y="0"/>
+          <a:ext cx="0" cy="0"/>
+          <a:chOff x="0" y="0"/>
+          <a:chExt cx="0" cy="0"/>
+        </a:xfrm>
+      </p:grpSpPr>
+      <p:sp>
+        <p:nvSpPr>
+          <p:cNvPr id="2" name="标题 1"/>
+          <p:cNvSpPr>
+            <a:spLocks noGrp="1"/>
+          </p:cNvSpPr>
+          <p:nvPr>
+            <p:ph type="title"/>
+          </p:nvPr>
+        </p:nvSpPr>
+        <p:spPr/>
+        <p:txBody>
+          <a:bodyPr/>
+          <a:lstStyle/>
+          <a:p>
+            <a:r>
+              <a:rPr lang="zh-CN" altLang="en-US" dirty="0" smtClean="0"/>
+              <a:t>图片测试</a:t>
+            </a:r>
+            <a:endParaRPr lang="zh-CN" altLang="en-US" dirty="0"/>
+          </a:p>
+        </p:txBody>
+      </p:sp>
+      <p:sp>
+        <p:nvSpPr>
+          <p:cNvPr id="3" name="内容占位符 2"/>
+          <p:cNvSpPr>
+            <a:spLocks noGrp="1"/>
+          </p:cNvSpPr>
+          <p:nvPr>
+            <p:ph idx="1"/>
+          </p:nvPr>
+        </p:nvSpPr>
+        <p:spPr/>
+        <p:txBody>
+          <a:bodyPr/>
+          <a:lstStyle/>
+          <a:p>
+            <a:endParaRPr lang="zh-CN" altLang="en-US" dirty="0"/>
+          </a:p>
+        </p:txBody>
+      </p:sp>
+      <p:pic>
+        <p:nvPicPr>
+          <p:cNvPr id="1026" name="Picture 2" descr="https://imgsa.baidu.com/exp/pic/item/fab3ac119313b07e15b606160ad7912397dd8c62.jpg"/>
+          <p:cNvPicPr>
+            <a:picLocks noChangeAspect="1" noChangeArrowheads="1"/>
+          </p:cNvPicPr>
+          <p:nvPr/>
+        </p:nvPicPr>
+        <p:blipFill>
+          <a:blip r:embed="rId2" cstate="print"/>
+          <a:srcRect/>
+          <a:stretch>
+            <a:fillRect/>
+          </a:stretch>
+        </p:blipFill>
+        <p:spPr bwMode="auto">
+          <a:xfrm>
+            <a:off x="834843" y="1689462"/>
+            <a:ext cx="8727168" cy="5020491"/>
+          </a:xfrm>
+          <a:prstGeom prst="rect">
+            <a:avLst/>
+          </a:prstGeom>
+          <a:noFill/>
+        </p:spPr>
+      </p:pic>
+    </p:spTree>
   </p:cSld>
   <p:clrMapOvr>
     <a:masterClrMapping/>
@@ -3432,7 +3550,7 @@
     </a:clrScheme>
     <a:fontScheme name="Office">
       <a:majorFont>
-        <a:latin typeface="Calibri Light" panose="020F0302020204030204"/>
+        <a:latin typeface="Calibri Light"/>
         <a:ea typeface=""/>
         <a:cs typeface=""/>
         <a:font script="Jpan" typeface="ＭＳ Ｐゴシック"/>
@@ -3467,7 +3585,7 @@
         <a:font script="Geor" typeface="Sylfaen"/>
       </a:majorFont>
       <a:minorFont>
-        <a:latin typeface="Calibri" panose="020F0502020204030204"/>
+        <a:latin typeface="Calibri"/>
         <a:ea typeface=""/>
         <a:cs typeface=""/>
         <a:font script="Jpan" typeface="ＭＳ Ｐゴシック"/>
@@ -3644,7 +3762,7 @@
   <a:extraClrSchemeLst/>
   <a:extLst>
     <a:ext uri="{05A4C25C-085E-4340-85A3-A5531E510DB2}">
-      <thm15:themeFamily xmlns:thm15="http://schemas.microsoft.com/office/thememl/2012/main" name="Office Theme" id="{62F939B6-93AF-4DB8-9C6B-D6C7DFDC589F}" vid="{4A3C46E8-61CC-4603-A589-7422A47A8E4A}"/>
+      <thm15:themeFamily xmlns:thm15="http://schemas.microsoft.com/office/thememl/2012/main" xmlns="" name="Office Theme" id="{62F939B6-93AF-4DB8-9C6B-D6C7DFDC589F}" vid="{4A3C46E8-61CC-4603-A589-7422A47A8E4A}"/>
     </a:ext>
   </a:extLst>
 </a:theme>

</xml_diff>